<commit_message>
Updated SA assignment 2
</commit_message>
<xml_diff>
--- a/Semester 2/Software Architecture/Assignment 2/SA-Assignment-2021MT12054.pptx
+++ b/Semester 2/Software Architecture/Assignment 2/SA-Assignment-2021MT12054.pptx
@@ -359,7 +359,7 @@
           <a:p>
             <a:fld id="{ED291B17-9318-49DB-B28B-6E5994AE9581}" type="datetime1">
               <a:rPr lang="en-US" smtClean="0"/>
-              <a:t>5/1/2022</a:t>
+              <a:t>5/2/2022</a:t>
             </a:fld>
             <a:endParaRPr lang="en-US" dirty="0"/>
           </a:p>
@@ -562,7 +562,7 @@
           <a:p>
             <a:fld id="{2CED4963-E985-44C4-B8C4-FDD613B7C2F8}" type="datetime1">
               <a:rPr lang="en-US" smtClean="0"/>
-              <a:t>5/1/2022</a:t>
+              <a:t>5/2/2022</a:t>
             </a:fld>
             <a:endParaRPr lang="en-US" dirty="0"/>
           </a:p>
@@ -924,7 +924,7 @@
           <a:p>
             <a:fld id="{ED291B17-9318-49DB-B28B-6E5994AE9581}" type="datetime1">
               <a:rPr lang="en-US" smtClean="0"/>
-              <a:t>5/1/2022</a:t>
+              <a:t>5/2/2022</a:t>
             </a:fld>
             <a:endParaRPr lang="en-US" dirty="0"/>
           </a:p>
@@ -1122,7 +1122,7 @@
           <a:p>
             <a:fld id="{78DD82B9-B8EE-4375-B6FF-88FA6ABB15D9}" type="datetime1">
               <a:rPr lang="en-US" smtClean="0"/>
-              <a:t>5/1/2022</a:t>
+              <a:t>5/2/2022</a:t>
             </a:fld>
             <a:endParaRPr lang="en-US" dirty="0"/>
           </a:p>
@@ -1434,7 +1434,7 @@
           <a:p>
             <a:fld id="{B2497495-0637-405E-AE64-5CC7506D51F5}" type="datetime1">
               <a:rPr lang="en-US" smtClean="0"/>
-              <a:t>5/1/2022</a:t>
+              <a:t>5/2/2022</a:t>
             </a:fld>
             <a:endParaRPr lang="en-US" dirty="0"/>
           </a:p>
@@ -1687,7 +1687,7 @@
           <a:p>
             <a:fld id="{7BFFD690-9426-415D-8B65-26881E07B2D4}" type="datetime1">
               <a:rPr lang="en-US" smtClean="0"/>
-              <a:t>5/1/2022</a:t>
+              <a:t>5/2/2022</a:t>
             </a:fld>
             <a:endParaRPr lang="en-US" dirty="0"/>
           </a:p>
@@ -2109,7 +2109,7 @@
           <a:p>
             <a:fld id="{04C4989A-474C-40DE-95B9-011C28B71673}" type="datetime1">
               <a:rPr lang="en-US" smtClean="0"/>
-              <a:t>5/1/2022</a:t>
+              <a:t>5/2/2022</a:t>
             </a:fld>
             <a:endParaRPr lang="en-US" dirty="0"/>
           </a:p>
@@ -2232,7 +2232,7 @@
           <a:p>
             <a:fld id="{5DB4ED54-5B5E-4A04-93D3-5772E3CE3818}" type="datetime1">
               <a:rPr lang="en-US" smtClean="0"/>
-              <a:t>5/1/2022</a:t>
+              <a:t>5/2/2022</a:t>
             </a:fld>
             <a:endParaRPr lang="en-US" dirty="0"/>
           </a:p>
@@ -2327,7 +2327,7 @@
           <a:p>
             <a:fld id="{4EDE50D6-574B-40AF-946F-D52A04ADE379}" type="datetime1">
               <a:rPr lang="en-US" smtClean="0"/>
-              <a:t>5/1/2022</a:t>
+              <a:t>5/2/2022</a:t>
             </a:fld>
             <a:endParaRPr lang="en-US" dirty="0"/>
           </a:p>
@@ -2704,7 +2704,7 @@
           <a:p>
             <a:fld id="{D82884F1-FFEA-405F-9602-3DCA865EDA4E}" type="datetime1">
               <a:rPr lang="en-US" smtClean="0"/>
-              <a:t>5/1/2022</a:t>
+              <a:t>5/2/2022</a:t>
             </a:fld>
             <a:endParaRPr lang="en-US" dirty="0"/>
           </a:p>
@@ -2997,7 +2997,7 @@
           <a:p>
             <a:fld id="{7E18DB4A-8810-4A10-AD5C-D5E2C667F5B3}" type="datetime1">
               <a:rPr lang="en-US" smtClean="0"/>
-              <a:t>5/1/2022</a:t>
+              <a:t>5/2/2022</a:t>
             </a:fld>
             <a:endParaRPr lang="en-US" dirty="0"/>
           </a:p>
@@ -3212,7 +3212,7 @@
           <a:p>
             <a:fld id="{ED291B17-9318-49DB-B28B-6E5994AE9581}" type="datetime1">
               <a:rPr lang="en-US" smtClean="0"/>
-              <a:t>5/1/2022</a:t>
+              <a:t>5/2/2022</a:t>
             </a:fld>
             <a:endParaRPr lang="en-US" dirty="0"/>
           </a:p>
@@ -4526,7 +4526,7 @@
         </p:spPr>
         <p:txBody>
           <a:bodyPr>
-            <a:normAutofit fontScale="92500" lnSpcReduction="20000"/>
+            <a:normAutofit lnSpcReduction="10000"/>
           </a:bodyPr>
           <a:lstStyle/>
           <a:p>
@@ -4536,43 +4536,90 @@
           <a:p>
             <a:pPr algn="just"/>
             <a:r>
+              <a:rPr lang="en-US" sz="1801" b="1" dirty="0"/>
+              <a:t>Highly available systems are necessary for smart homes</a:t>
+            </a:r>
+            <a:r>
               <a:rPr lang="en-US" sz="1801" dirty="0"/>
-              <a:t>Highly available systems are necessary for smart homes. Smart systems can save a home from a disaster (Like in the case of gas management system), and if a failed system does not default to a mode of operation or have means to come back up fast then the results could be catastrophic.</a:t>
+              <a:t>. Smart systems can save a home from a disaster (Like in the case of gas management system), and </a:t>
+            </a:r>
+            <a:r>
+              <a:rPr lang="en-US" sz="1801" b="1" dirty="0"/>
+              <a:t>if a failed system does not default to a mode of operation or have means to come back up fast, the results could be catastrophic</a:t>
+            </a:r>
+            <a:r>
+              <a:rPr lang="en-US" sz="1801" dirty="0"/>
+              <a:t>. we also need to make sure that the cloud services that will be used by the mobile app also is HA</a:t>
+            </a:r>
+            <a:r>
+              <a:rPr lang="en-US" sz="1801" b="1" dirty="0"/>
+              <a:t>. One would need to scale up the services when the number of active users increase</a:t>
+            </a:r>
+            <a:r>
+              <a:rPr lang="en-US" sz="1801" dirty="0"/>
+              <a:t>. Since adoption rates of smart home technology is accelerating, we need to make sure that these rapidly increasing customers base could be served with little downtime.</a:t>
             </a:r>
           </a:p>
           <a:p>
             <a:pPr algn="just"/>
             <a:r>
               <a:rPr lang="en-US" sz="1801" dirty="0"/>
-              <a:t>When it comes to designing smart homes, we need to make sure that the standards and the communication mode used are future proofed. Smart home technology evolves very fast, and systems must have the capability of interfacing with new devices without any hassle.</a:t>
+              <a:t>When it comes to designing smart homes, we need to make sure that the </a:t>
+            </a:r>
+            <a:r>
+              <a:rPr lang="en-US" sz="1801" b="1" dirty="0"/>
+              <a:t>standards and the communication mode used are future proofed</a:t>
+            </a:r>
+            <a:r>
+              <a:rPr lang="en-US" sz="1801" dirty="0"/>
+              <a:t>. Smart home technology evolves very fast, and systems must have the capability of interfacing with new devices without any hassle. </a:t>
             </a:r>
           </a:p>
           <a:p>
             <a:pPr algn="just"/>
             <a:r>
               <a:rPr lang="en-US" sz="1801" dirty="0"/>
-              <a:t>Apart from designing highly available smart hubs we also need to make sure that the cloud services that will be used by the mobile app also is HA. One would need to scale up the services when the number of active users increase. Since adoption rates of smart home technology is accelerating, we need to make sure that these rapidly increasing customers base could be served with little downtime.</a:t>
-            </a:r>
-          </a:p>
-          <a:p>
-            <a:pPr algn="just"/>
+              <a:t>The </a:t>
+            </a:r>
+            <a:r>
+              <a:rPr lang="en-US" sz="1801" b="1" dirty="0"/>
+              <a:t>component connection diagrams help developers visualize implementation strategies much earlier in system designing</a:t>
+            </a:r>
             <a:r>
               <a:rPr lang="en-US" sz="1801" dirty="0"/>
-              <a:t>The component connection diagrams help developers visualize implementation strategies much earlier in system designing and makes planning (especially in AGILE) much easier.</a:t>
-            </a:r>
-          </a:p>
-          <a:p>
-            <a:pPr algn="just"/>
+              <a:t> and makes planning (especially in AGILE) much easier. The </a:t>
+            </a:r>
+            <a:r>
+              <a:rPr lang="en-US" sz="1801" b="1" dirty="0"/>
+              <a:t>deployment view gives a clear image to operation teams on how the application modules are deployed</a:t>
+            </a:r>
             <a:r>
               <a:rPr lang="en-US" sz="1801" dirty="0"/>
-              <a:t>The deployment view gives a clear image to operation teams on how the application modules are deployed and helps in rough estimation of cost early on and eases planning.</a:t>
-            </a:r>
-          </a:p>
-          <a:p>
-            <a:pPr algn="just"/>
+              <a:t> and helps in </a:t>
+            </a:r>
+            <a:r>
+              <a:rPr lang="en-US" sz="1801" b="1" dirty="0"/>
+              <a:t>rough estimation of cost</a:t>
+            </a:r>
             <a:r>
               <a:rPr lang="en-US" sz="1801" dirty="0"/>
-              <a:t>Sequence diagrams for different use cases give developers a clear idea on what is expected from the system and all the players involved in that use case. This will also ease development planning.</a:t>
+              <a:t> early on and eases planning. </a:t>
+            </a:r>
+            <a:r>
+              <a:rPr lang="en-US" sz="1801" b="1" dirty="0"/>
+              <a:t>Sequence diagrams for different use cases give developers a clear idea on what is expected from the system</a:t>
+            </a:r>
+            <a:r>
+              <a:rPr lang="en-US" sz="1801" dirty="0"/>
+              <a:t> and all the players involved in that use case. This will also </a:t>
+            </a:r>
+            <a:r>
+              <a:rPr lang="en-US" sz="1801" b="1" dirty="0"/>
+              <a:t>ease development planning</a:t>
+            </a:r>
+            <a:r>
+              <a:rPr lang="en-US" sz="1801" dirty="0"/>
+              <a:t>.</a:t>
             </a:r>
           </a:p>
           <a:p>
@@ -6668,15 +6715,6 @@
 </file>
 
 <file path=customXml/item1.xml><?xml version="1.0" encoding="utf-8"?>
-<?mso-contentType ?>
-<FormTemplates xmlns="http://schemas.microsoft.com/sharepoint/v3/contenttype/forms">
-  <Display>DocumentLibraryForm</Display>
-  <Edit>DocumentLibraryForm</Edit>
-  <New>DocumentLibraryForm</New>
-</FormTemplates>
-</file>
-
-<file path=customXml/item2.xml><?xml version="1.0" encoding="utf-8"?>
 <ct:contentTypeSchema xmlns:ct="http://schemas.microsoft.com/office/2006/metadata/contentType" xmlns:ma="http://schemas.microsoft.com/office/2006/metadata/properties/metaAttributes" ct:_="" ma:_="" ma:contentTypeName="Document" ma:contentTypeID="0x01010079F111ED35F8CC479449609E8A0923A6" ma:contentTypeVersion="12" ma:contentTypeDescription="Create a new document." ma:contentTypeScope="" ma:versionID="a410dd7f93c95333ffa1b60ed6adedd1">
   <xsd:schema xmlns:xsd="http://www.w3.org/2001/XMLSchema" xmlns:xs="http://www.w3.org/2001/XMLSchema" xmlns:p="http://schemas.microsoft.com/office/2006/metadata/properties" xmlns:ns2="71af3243-3dd4-4a8d-8c0d-dd76da1f02a5" xmlns:ns3="16c05727-aa75-4e4a-9b5f-8a80a1165891" targetNamespace="http://schemas.microsoft.com/office/2006/metadata/properties" ma:root="true" ma:fieldsID="a936d9baba76aa3866493feff160faab" ns2:_="" ns3:_="">
     <xsd:import namespace="71af3243-3dd4-4a8d-8c0d-dd76da1f02a5"/>
@@ -6897,6 +6935,15 @@
 </ct:contentTypeSchema>
 </file>
 
+<file path=customXml/item2.xml><?xml version="1.0" encoding="utf-8"?>
+<?mso-contentType ?>
+<FormTemplates xmlns="http://schemas.microsoft.com/sharepoint/v3/contenttype/forms">
+  <Display>DocumentLibraryForm</Display>
+  <Edit>DocumentLibraryForm</Edit>
+  <New>DocumentLibraryForm</New>
+</FormTemplates>
+</file>
+
 <file path=customXml/item3.xml><?xml version="1.0" encoding="utf-8"?>
 <p:properties xmlns:p="http://schemas.microsoft.com/office/2006/metadata/properties" xmlns:xsi="http://www.w3.org/2001/XMLSchema-instance" xmlns:pc="http://schemas.microsoft.com/office/infopath/2007/PartnerControls">
   <documentManagement>
@@ -6907,14 +6954,6 @@
 </file>
 
 <file path=customXml/itemProps1.xml><?xml version="1.0" encoding="utf-8"?>
-<ds:datastoreItem xmlns:ds="http://schemas.openxmlformats.org/officeDocument/2006/customXml" ds:itemID="{927BD4C1-B6B1-4715-ABF9-E660A51A4EA0}">
-  <ds:schemaRefs>
-    <ds:schemaRef ds:uri="http://schemas.microsoft.com/sharepoint/v3/contenttype/forms"/>
-  </ds:schemaRefs>
-</ds:datastoreItem>
-</file>
-
-<file path=customXml/itemProps2.xml><?xml version="1.0" encoding="utf-8"?>
 <ds:datastoreItem xmlns:ds="http://schemas.openxmlformats.org/officeDocument/2006/customXml" ds:itemID="{41E7CA09-9778-4414-AE97-8064B12DA30E}">
   <ds:schemaRefs>
     <ds:schemaRef ds:uri="http://schemas.microsoft.com/office/2006/metadata/contentType"/>
@@ -6933,12 +6972,27 @@
 </ds:datastoreItem>
 </file>
 
+<file path=customXml/itemProps2.xml><?xml version="1.0" encoding="utf-8"?>
+<ds:datastoreItem xmlns:ds="http://schemas.openxmlformats.org/officeDocument/2006/customXml" ds:itemID="{927BD4C1-B6B1-4715-ABF9-E660A51A4EA0}">
+  <ds:schemaRefs>
+    <ds:schemaRef ds:uri="http://schemas.microsoft.com/sharepoint/v3/contenttype/forms"/>
+  </ds:schemaRefs>
+</ds:datastoreItem>
+</file>
+
 <file path=customXml/itemProps3.xml><?xml version="1.0" encoding="utf-8"?>
 <ds:datastoreItem xmlns:ds="http://schemas.openxmlformats.org/officeDocument/2006/customXml" ds:itemID="{8D289AE2-D2AE-49D1-AFAC-3A79F6794255}">
   <ds:schemaRefs>
+    <ds:schemaRef ds:uri="http://purl.org/dc/elements/1.1/"/>
+    <ds:schemaRef ds:uri="http://schemas.microsoft.com/office/2006/documentManagement/types"/>
+    <ds:schemaRef ds:uri="http://purl.org/dc/terms/"/>
+    <ds:schemaRef ds:uri="16c05727-aa75-4e4a-9b5f-8a80a1165891"/>
+    <ds:schemaRef ds:uri="http://purl.org/dc/dcmitype/"/>
+    <ds:schemaRef ds:uri="http://schemas.microsoft.com/office/infopath/2007/PartnerControls"/>
+    <ds:schemaRef ds:uri="http://schemas.openxmlformats.org/package/2006/metadata/core-properties"/>
+    <ds:schemaRef ds:uri="71af3243-3dd4-4a8d-8c0d-dd76da1f02a5"/>
     <ds:schemaRef ds:uri="http://schemas.microsoft.com/office/2006/metadata/properties"/>
-    <ds:schemaRef ds:uri="http://schemas.microsoft.com/office/infopath/2007/PartnerControls"/>
-    <ds:schemaRef ds:uri="71af3243-3dd4-4a8d-8c0d-dd76da1f02a5"/>
+    <ds:schemaRef ds:uri="http://www.w3.org/XML/1998/namespace"/>
   </ds:schemaRefs>
 </ds:datastoreItem>
 </file>
</xml_diff>